<commit_message>
Update Introdução ao Box Model.pptx
</commit_message>
<xml_diff>
--- a/Lógica e Programação/Módulo 01 - HTML e CSS/Aula 06 - Introdução ao Box Model/Introdução ao Box Model.pptx
+++ b/Lógica e Programação/Módulo 01 - HTML e CSS/Aula 06 - Introdução ao Box Model/Introdução ao Box Model.pptx
@@ -247,7 +247,7 @@
           <a:p>
             <a:fld id="{0F28648D-752F-4D9E-8EC2-61293C3E9BC7}" type="datetimeFigureOut">
               <a:rPr lang="pt-BR" smtClean="0"/>
-              <a:t>04/02/2025</a:t>
+              <a:t>27/02/2025</a:t>
             </a:fld>
             <a:endParaRPr lang="pt-BR"/>
           </a:p>
@@ -424,7 +424,7 @@
           <a:p>
             <a:fld id="{C67E822F-2664-47C4-8404-83B1D4D0E6EE}" type="datetimeFigureOut">
               <a:rPr lang="pt-BR" smtClean="0"/>
-              <a:t>04/02/2025</a:t>
+              <a:t>27/02/2025</a:t>
             </a:fld>
             <a:endParaRPr lang="pt-BR"/>
           </a:p>
@@ -1127,7 +1127,7 @@
           <a:p>
             <a:fld id="{CDD55C27-F8C6-4481-8569-CAC50CAE9F1F}" type="datetimeFigureOut">
               <a:rPr lang="pt-BR" smtClean="0"/>
-              <a:t>04/02/2025</a:t>
+              <a:t>27/02/2025</a:t>
             </a:fld>
             <a:endParaRPr lang="pt-BR"/>
           </a:p>
@@ -1617,7 +1617,7 @@
           <a:p>
             <a:fld id="{CDD55C27-F8C6-4481-8569-CAC50CAE9F1F}" type="datetimeFigureOut">
               <a:rPr lang="pt-BR" smtClean="0"/>
-              <a:t>04/02/2025</a:t>
+              <a:t>27/02/2025</a:t>
             </a:fld>
             <a:endParaRPr lang="pt-BR"/>
           </a:p>
@@ -1920,7 +1920,7 @@
           <a:p>
             <a:fld id="{CDD55C27-F8C6-4481-8569-CAC50CAE9F1F}" type="datetimeFigureOut">
               <a:rPr lang="pt-BR" smtClean="0"/>
-              <a:t>04/02/2025</a:t>
+              <a:t>27/02/2025</a:t>
             </a:fld>
             <a:endParaRPr lang="pt-BR"/>
           </a:p>
@@ -2371,7 +2371,7 @@
           <a:p>
             <a:fld id="{CDD55C27-F8C6-4481-8569-CAC50CAE9F1F}" type="datetimeFigureOut">
               <a:rPr lang="pt-BR" smtClean="0"/>
-              <a:t>04/02/2025</a:t>
+              <a:t>27/02/2025</a:t>
             </a:fld>
             <a:endParaRPr lang="pt-BR"/>
           </a:p>
@@ -2544,7 +2544,7 @@
           <a:p>
             <a:fld id="{CDD55C27-F8C6-4481-8569-CAC50CAE9F1F}" type="datetimeFigureOut">
               <a:rPr lang="pt-BR" smtClean="0"/>
-              <a:t>04/02/2025</a:t>
+              <a:t>27/02/2025</a:t>
             </a:fld>
             <a:endParaRPr lang="pt-BR"/>
           </a:p>
@@ -2681,7 +2681,7 @@
           <a:p>
             <a:fld id="{CDD55C27-F8C6-4481-8569-CAC50CAE9F1F}" type="datetimeFigureOut">
               <a:rPr lang="pt-BR" smtClean="0"/>
-              <a:t>04/02/2025</a:t>
+              <a:t>27/02/2025</a:t>
             </a:fld>
             <a:endParaRPr lang="pt-BR"/>
           </a:p>
@@ -3025,7 +3025,7 @@
           <a:p>
             <a:fld id="{CDD55C27-F8C6-4481-8569-CAC50CAE9F1F}" type="datetimeFigureOut">
               <a:rPr lang="pt-BR" smtClean="0"/>
-              <a:t>04/02/2025</a:t>
+              <a:t>27/02/2025</a:t>
             </a:fld>
             <a:endParaRPr lang="pt-BR"/>
           </a:p>
@@ -3346,7 +3346,7 @@
           <a:p>
             <a:fld id="{CDD55C27-F8C6-4481-8569-CAC50CAE9F1F}" type="datetimeFigureOut">
               <a:rPr lang="pt-BR" smtClean="0"/>
-              <a:t>04/02/2025</a:t>
+              <a:t>27/02/2025</a:t>
             </a:fld>
             <a:endParaRPr lang="pt-BR"/>
           </a:p>
@@ -13891,7 +13891,7 @@
         </p:nvSpPr>
         <p:spPr>
           <a:xfrm>
-            <a:off x="592347" y="1844675"/>
+            <a:off x="592347" y="1854006"/>
             <a:ext cx="11007306" cy="602434"/>
           </a:xfrm>
         </p:spPr>

</xml_diff>